<commit_message>
Added bitmap output to oled display
</commit_message>
<xml_diff>
--- a/docs/images/Shematic.pptx
+++ b/docs/images/Shematic.pptx
@@ -5,12 +5,14 @@
     <p:sldMasterId id="2147483690" r:id="rId1"/>
   </p:sldMasterIdLst>
   <p:notesMasterIdLst>
-    <p:notesMasterId r:id="rId5"/>
+    <p:notesMasterId r:id="rId7"/>
   </p:notesMasterIdLst>
   <p:sldIdLst>
     <p:sldId id="285" r:id="rId2"/>
     <p:sldId id="262" r:id="rId3"/>
     <p:sldId id="269" r:id="rId4"/>
+    <p:sldId id="286" r:id="rId5"/>
+    <p:sldId id="287" r:id="rId6"/>
   </p:sldIdLst>
   <p:sldSz cx="12192000" cy="6858000"/>
   <p:notesSz cx="6858000" cy="9144000"/>
@@ -120,13 +122,84 @@
 <file path=ppt/revisionInfo.xml><?xml version="1.0" encoding="utf-8"?>
 <p1510:revInfo xmlns:a="http://schemas.openxmlformats.org/drawingml/2006/main" xmlns:r="http://schemas.openxmlformats.org/officeDocument/2006/relationships" xmlns:p1510="http://schemas.microsoft.com/office/powerpoint/2015/10/main">
   <p1510:revLst>
-    <p1510:client id="{3193A23C-2F6C-4FFD-BFB7-5746B6FA049E}" v="5" dt="2025-02-09T19:24:02.156"/>
+    <p1510:client id="{C51E0E16-75F0-409E-8908-12C52B154A5F}" v="9" dt="2025-06-18T16:05:11.616"/>
   </p1510:revLst>
 </p1510:revInfo>
 </file>
 
 <file path=ppt/changesInfos/changesInfo1.xml><?xml version="1.0" encoding="utf-8"?>
 <pc:chgInfo xmlns:a="http://schemas.openxmlformats.org/drawingml/2006/main" xmlns:r="http://schemas.openxmlformats.org/officeDocument/2006/relationships" xmlns:ac="http://schemas.microsoft.com/office/drawing/2013/main/command" xmlns:pc="http://schemas.microsoft.com/office/powerpoint/2013/main/command">
+  <pc:docChgLst>
+    <pc:chgData name="Jan K" userId="d066db4a5de46abf" providerId="LiveId" clId="{C51E0E16-75F0-409E-8908-12C52B154A5F}"/>
+    <pc:docChg chg="addSld modSld">
+      <pc:chgData name="Jan K" userId="d066db4a5de46abf" providerId="LiveId" clId="{C51E0E16-75F0-409E-8908-12C52B154A5F}" dt="2025-06-18T16:05:26.019" v="74" actId="1076"/>
+      <pc:docMkLst>
+        <pc:docMk/>
+      </pc:docMkLst>
+      <pc:sldChg chg="addSp new">
+        <pc:chgData name="Jan K" userId="d066db4a5de46abf" providerId="LiveId" clId="{C51E0E16-75F0-409E-8908-12C52B154A5F}" dt="2025-06-14T11:49:09.501" v="1"/>
+        <pc:sldMkLst>
+          <pc:docMk/>
+          <pc:sldMk cId="1590190944" sldId="286"/>
+        </pc:sldMkLst>
+        <pc:picChg chg="add">
+          <ac:chgData name="Jan K" userId="d066db4a5de46abf" providerId="LiveId" clId="{C51E0E16-75F0-409E-8908-12C52B154A5F}" dt="2025-06-14T11:49:09.501" v="1"/>
+          <ac:picMkLst>
+            <pc:docMk/>
+            <pc:sldMk cId="1590190944" sldId="286"/>
+            <ac:picMk id="1026" creationId="{95E56769-4608-D617-672B-831A1CEBF4B6}"/>
+          </ac:picMkLst>
+        </pc:picChg>
+      </pc:sldChg>
+      <pc:sldChg chg="addSp modSp new mod">
+        <pc:chgData name="Jan K" userId="d066db4a5de46abf" providerId="LiveId" clId="{C51E0E16-75F0-409E-8908-12C52B154A5F}" dt="2025-06-18T16:05:26.019" v="74" actId="1076"/>
+        <pc:sldMkLst>
+          <pc:docMk/>
+          <pc:sldMk cId="882265010" sldId="287"/>
+        </pc:sldMkLst>
+        <pc:spChg chg="add mod">
+          <ac:chgData name="Jan K" userId="d066db4a5de46abf" providerId="LiveId" clId="{C51E0E16-75F0-409E-8908-12C52B154A5F}" dt="2025-06-14T11:50:48.450" v="64" actId="207"/>
+          <ac:spMkLst>
+            <pc:docMk/>
+            <pc:sldMk cId="882265010" sldId="287"/>
+            <ac:spMk id="3" creationId="{4779A9F2-1586-5BAD-5C8B-75199AAA73B7}"/>
+          </ac:spMkLst>
+        </pc:spChg>
+        <pc:spChg chg="add mod">
+          <ac:chgData name="Jan K" userId="d066db4a5de46abf" providerId="LiveId" clId="{C51E0E16-75F0-409E-8908-12C52B154A5F}" dt="2025-06-14T11:50:51.386" v="65" actId="207"/>
+          <ac:spMkLst>
+            <pc:docMk/>
+            <pc:sldMk cId="882265010" sldId="287"/>
+            <ac:spMk id="4" creationId="{D588DFE0-4FB9-F8D4-32CF-CBAB3BDE271C}"/>
+          </ac:spMkLst>
+        </pc:spChg>
+        <pc:spChg chg="add mod">
+          <ac:chgData name="Jan K" userId="d066db4a5de46abf" providerId="LiveId" clId="{C51E0E16-75F0-409E-8908-12C52B154A5F}" dt="2025-06-14T11:50:42.341" v="63" actId="207"/>
+          <ac:spMkLst>
+            <pc:docMk/>
+            <pc:sldMk cId="882265010" sldId="287"/>
+            <ac:spMk id="5" creationId="{A172594B-5F4B-46D5-0B07-A93AD0A5ACE8}"/>
+          </ac:spMkLst>
+        </pc:spChg>
+        <pc:spChg chg="add mod">
+          <ac:chgData name="Jan K" userId="d066db4a5de46abf" providerId="LiveId" clId="{C51E0E16-75F0-409E-8908-12C52B154A5F}" dt="2025-06-18T16:05:26.019" v="74" actId="1076"/>
+          <ac:spMkLst>
+            <pc:docMk/>
+            <pc:sldMk cId="882265010" sldId="287"/>
+            <ac:spMk id="6" creationId="{9F84748A-5999-7088-8F60-578213BA9B1D}"/>
+          </ac:spMkLst>
+        </pc:spChg>
+        <pc:picChg chg="add mod">
+          <ac:chgData name="Jan K" userId="d066db4a5de46abf" providerId="LiveId" clId="{C51E0E16-75F0-409E-8908-12C52B154A5F}" dt="2025-06-14T11:49:23.031" v="6" actId="1076"/>
+          <ac:picMkLst>
+            <pc:docMk/>
+            <pc:sldMk cId="882265010" sldId="287"/>
+            <ac:picMk id="2" creationId="{FE6F5977-9C70-A62E-3548-ECE0837AEFFB}"/>
+          </ac:picMkLst>
+        </pc:picChg>
+      </pc:sldChg>
+    </pc:docChg>
+  </pc:docChgLst>
   <pc:docChgLst>
     <pc:chgData name="Jan K" userId="d066db4a5de46abf" providerId="LiveId" clId="{3193A23C-2F6C-4FFD-BFB7-5746B6FA049E}"/>
     <pc:docChg chg="custSel addSld modSld">
@@ -2742,7 +2815,7 @@
           <a:p>
             <a:fld id="{6A60FB70-4477-4AB3-9888-A31104B7E1BE}" type="datetimeFigureOut">
               <a:rPr lang="en-US" smtClean="0"/>
-              <a:t>6/8/2025</a:t>
+              <a:t>6/18/2025</a:t>
             </a:fld>
             <a:endParaRPr lang="en-US"/>
           </a:p>
@@ -3971,7 +4044,7 @@
           <a:p>
             <a:fld id="{FA078936-32F4-4A2C-8CD4-8C02C956183F}" type="datetimeFigureOut">
               <a:rPr lang="en-DE" smtClean="0"/>
-              <a:t>06/08/2025</a:t>
+              <a:t>06/18/2025</a:t>
             </a:fld>
             <a:endParaRPr lang="en-DE"/>
           </a:p>
@@ -4162,7 +4235,7 @@
           <a:p>
             <a:fld id="{FA078936-32F4-4A2C-8CD4-8C02C956183F}" type="datetimeFigureOut">
               <a:rPr lang="en-DE" smtClean="0"/>
-              <a:t>06/08/2025</a:t>
+              <a:t>06/18/2025</a:t>
             </a:fld>
             <a:endParaRPr lang="en-DE"/>
           </a:p>
@@ -7002,7 +7075,7 @@
           <a:p>
             <a:fld id="{FA078936-32F4-4A2C-8CD4-8C02C956183F}" type="datetimeFigureOut">
               <a:rPr lang="en-DE" smtClean="0"/>
-              <a:t>06/08/2025</a:t>
+              <a:t>06/18/2025</a:t>
             </a:fld>
             <a:endParaRPr lang="en-DE"/>
           </a:p>
@@ -7292,7 +7365,7 @@
           <a:p>
             <a:fld id="{FA078936-32F4-4A2C-8CD4-8C02C956183F}" type="datetimeFigureOut">
               <a:rPr lang="en-DE" smtClean="0"/>
-              <a:t>06/08/2025</a:t>
+              <a:t>06/18/2025</a:t>
             </a:fld>
             <a:endParaRPr lang="en-DE"/>
           </a:p>
@@ -7690,7 +7763,7 @@
           <a:p>
             <a:fld id="{FA078936-32F4-4A2C-8CD4-8C02C956183F}" type="datetimeFigureOut">
               <a:rPr lang="en-DE" smtClean="0"/>
-              <a:t>06/08/2025</a:t>
+              <a:t>06/18/2025</a:t>
             </a:fld>
             <a:endParaRPr lang="en-DE"/>
           </a:p>
@@ -19774,6 +19847,422 @@
 </p:sld>
 </file>
 
+<file path=ppt/slides/slide4.xml><?xml version="1.0" encoding="utf-8"?>
+<p:sld xmlns:a="http://schemas.openxmlformats.org/drawingml/2006/main" xmlns:r="http://schemas.openxmlformats.org/officeDocument/2006/relationships" xmlns:p="http://schemas.openxmlformats.org/presentationml/2006/main">
+  <p:cSld>
+    <p:spTree>
+      <p:nvGrpSpPr>
+        <p:cNvPr id="1" name=""/>
+        <p:cNvGrpSpPr/>
+        <p:nvPr/>
+      </p:nvGrpSpPr>
+      <p:grpSpPr>
+        <a:xfrm>
+          <a:off x="0" y="0"/>
+          <a:ext cx="0" cy="0"/>
+          <a:chOff x="0" y="0"/>
+          <a:chExt cx="0" cy="0"/>
+        </a:xfrm>
+      </p:grpSpPr>
+      <p:pic>
+        <p:nvPicPr>
+          <p:cNvPr id="1026" name="Picture 2">
+            <a:extLst>
+              <a:ext uri="{FF2B5EF4-FFF2-40B4-BE49-F238E27FC236}">
+                <a16:creationId xmlns:a16="http://schemas.microsoft.com/office/drawing/2014/main" id="{95E56769-4608-D617-672B-831A1CEBF4B6}"/>
+              </a:ext>
+            </a:extLst>
+          </p:cNvPr>
+          <p:cNvPicPr>
+            <a:picLocks noChangeAspect="1" noChangeArrowheads="1"/>
+          </p:cNvPicPr>
+          <p:nvPr/>
+        </p:nvPicPr>
+        <p:blipFill>
+          <a:blip r:embed="rId2">
+            <a:extLst>
+              <a:ext uri="{28A0092B-C50C-407E-A947-70E740481C1C}">
+                <a14:useLocalDpi xmlns:a14="http://schemas.microsoft.com/office/drawing/2010/main" val="0"/>
+              </a:ext>
+            </a:extLst>
+          </a:blip>
+          <a:srcRect/>
+          <a:stretch>
+            <a:fillRect/>
+          </a:stretch>
+        </p:blipFill>
+        <p:spPr bwMode="auto">
+          <a:xfrm>
+            <a:off x="368300" y="0"/>
+            <a:ext cx="11453813" cy="6858000"/>
+          </a:xfrm>
+          <a:prstGeom prst="rect">
+            <a:avLst/>
+          </a:prstGeom>
+          <a:noFill/>
+          <a:extLst>
+            <a:ext uri="{909E8E84-426E-40DD-AFC4-6F175D3DCCD1}">
+              <a14:hiddenFill xmlns:a14="http://schemas.microsoft.com/office/drawing/2010/main">
+                <a:solidFill>
+                  <a:srgbClr val="FFFFFF"/>
+                </a:solidFill>
+              </a14:hiddenFill>
+            </a:ext>
+          </a:extLst>
+        </p:spPr>
+      </p:pic>
+    </p:spTree>
+    <p:extLst>
+      <p:ext uri="{BB962C8B-B14F-4D97-AF65-F5344CB8AC3E}">
+        <p14:creationId xmlns:p14="http://schemas.microsoft.com/office/powerpoint/2010/main" val="1590190944"/>
+      </p:ext>
+    </p:extLst>
+  </p:cSld>
+  <p:clrMapOvr>
+    <a:masterClrMapping/>
+  </p:clrMapOvr>
+</p:sld>
+</file>
+
+<file path=ppt/slides/slide5.xml><?xml version="1.0" encoding="utf-8"?>
+<p:sld xmlns:a="http://schemas.openxmlformats.org/drawingml/2006/main" xmlns:r="http://schemas.openxmlformats.org/officeDocument/2006/relationships" xmlns:p="http://schemas.openxmlformats.org/presentationml/2006/main">
+  <p:cSld>
+    <p:spTree>
+      <p:nvGrpSpPr>
+        <p:cNvPr id="1" name=""/>
+        <p:cNvGrpSpPr/>
+        <p:nvPr/>
+      </p:nvGrpSpPr>
+      <p:grpSpPr>
+        <a:xfrm>
+          <a:off x="0" y="0"/>
+          <a:ext cx="0" cy="0"/>
+          <a:chOff x="0" y="0"/>
+          <a:chExt cx="0" cy="0"/>
+        </a:xfrm>
+      </p:grpSpPr>
+      <p:pic>
+        <p:nvPicPr>
+          <p:cNvPr id="2" name="Picture 2">
+            <a:extLst>
+              <a:ext uri="{FF2B5EF4-FFF2-40B4-BE49-F238E27FC236}">
+                <a16:creationId xmlns:a16="http://schemas.microsoft.com/office/drawing/2014/main" id="{FE6F5977-9C70-A62E-3548-ECE0837AEFFB}"/>
+              </a:ext>
+            </a:extLst>
+          </p:cNvPr>
+          <p:cNvPicPr>
+            <a:picLocks noChangeAspect="1" noChangeArrowheads="1"/>
+          </p:cNvPicPr>
+          <p:nvPr/>
+        </p:nvPicPr>
+        <p:blipFill>
+          <a:blip r:embed="rId2">
+            <a:extLst>
+              <a:ext uri="{28A0092B-C50C-407E-A947-70E740481C1C}">
+                <a14:useLocalDpi xmlns:a14="http://schemas.microsoft.com/office/drawing/2010/main" val="0"/>
+              </a:ext>
+            </a:extLst>
+          </a:blip>
+          <a:srcRect/>
+          <a:stretch>
+            <a:fillRect/>
+          </a:stretch>
+        </p:blipFill>
+        <p:spPr bwMode="auto">
+          <a:xfrm>
+            <a:off x="2817297" y="1159498"/>
+            <a:ext cx="6557406" cy="3926264"/>
+          </a:xfrm>
+          <a:prstGeom prst="rect">
+            <a:avLst/>
+          </a:prstGeom>
+          <a:noFill/>
+          <a:extLst>
+            <a:ext uri="{909E8E84-426E-40DD-AFC4-6F175D3DCCD1}">
+              <a14:hiddenFill xmlns:a14="http://schemas.microsoft.com/office/drawing/2010/main">
+                <a:solidFill>
+                  <a:srgbClr val="FFFFFF"/>
+                </a:solidFill>
+              </a14:hiddenFill>
+            </a:ext>
+          </a:extLst>
+        </p:spPr>
+      </p:pic>
+      <p:sp>
+        <p:nvSpPr>
+          <p:cNvPr id="3" name="Rectangle 2">
+            <a:extLst>
+              <a:ext uri="{FF2B5EF4-FFF2-40B4-BE49-F238E27FC236}">
+                <a16:creationId xmlns:a16="http://schemas.microsoft.com/office/drawing/2014/main" id="{4779A9F2-1586-5BAD-5C8B-75199AAA73B7}"/>
+              </a:ext>
+            </a:extLst>
+          </p:cNvPr>
+          <p:cNvSpPr/>
+          <p:nvPr/>
+        </p:nvSpPr>
+        <p:spPr>
+          <a:xfrm>
+            <a:off x="1506971" y="2253007"/>
+            <a:ext cx="1310326" cy="395926"/>
+          </a:xfrm>
+          <a:prstGeom prst="rect">
+            <a:avLst/>
+          </a:prstGeom>
+          <a:solidFill>
+            <a:schemeClr val="accent2"/>
+          </a:solidFill>
+          <a:ln>
+            <a:noFill/>
+          </a:ln>
+        </p:spPr>
+        <p:style>
+          <a:lnRef idx="2">
+            <a:schemeClr val="accent1">
+              <a:shade val="50000"/>
+            </a:schemeClr>
+          </a:lnRef>
+          <a:fillRef idx="1">
+            <a:schemeClr val="accent1"/>
+          </a:fillRef>
+          <a:effectRef idx="0">
+            <a:schemeClr val="accent1"/>
+          </a:effectRef>
+          <a:fontRef idx="minor">
+            <a:schemeClr val="lt1"/>
+          </a:fontRef>
+        </p:style>
+        <p:txBody>
+          <a:bodyPr rot="0" spcFirstLastPara="0" vertOverflow="overflow" horzOverflow="overflow" vert="horz" wrap="square" lIns="72000" tIns="72000" rIns="72000" bIns="72000" numCol="1" spcCol="0" rtlCol="0" fromWordArt="0" anchor="ctr" anchorCtr="0" forceAA="0" compatLnSpc="1">
+            <a:prstTxWarp prst="textNoShape">
+              <a:avLst/>
+            </a:prstTxWarp>
+            <a:noAutofit/>
+          </a:bodyPr>
+          <a:lstStyle/>
+          <a:p>
+            <a:pPr marL="180975" indent="-180975" algn="ctr">
+              <a:spcBef>
+                <a:spcPts val="200"/>
+              </a:spcBef>
+              <a:buFont typeface="Calibri" panose="020F0502020204030204" pitchFamily="34" charset="0"/>
+              <a:buChar char="▪"/>
+            </a:pPr>
+            <a:r>
+              <a:rPr lang="en-US" sz="1400" dirty="0"/>
+              <a:t>OLED Display</a:t>
+            </a:r>
+          </a:p>
+        </p:txBody>
+      </p:sp>
+      <p:sp>
+        <p:nvSpPr>
+          <p:cNvPr id="4" name="Rectangle 3">
+            <a:extLst>
+              <a:ext uri="{FF2B5EF4-FFF2-40B4-BE49-F238E27FC236}">
+                <a16:creationId xmlns:a16="http://schemas.microsoft.com/office/drawing/2014/main" id="{D588DFE0-4FB9-F8D4-32CF-CBAB3BDE271C}"/>
+              </a:ext>
+            </a:extLst>
+          </p:cNvPr>
+          <p:cNvSpPr/>
+          <p:nvPr/>
+        </p:nvSpPr>
+        <p:spPr>
+          <a:xfrm>
+            <a:off x="9624767" y="3940405"/>
+            <a:ext cx="1310326" cy="592317"/>
+          </a:xfrm>
+          <a:prstGeom prst="rect">
+            <a:avLst/>
+          </a:prstGeom>
+          <a:solidFill>
+            <a:schemeClr val="accent2"/>
+          </a:solidFill>
+          <a:ln>
+            <a:noFill/>
+          </a:ln>
+        </p:spPr>
+        <p:style>
+          <a:lnRef idx="2">
+            <a:schemeClr val="accent1">
+              <a:shade val="50000"/>
+            </a:schemeClr>
+          </a:lnRef>
+          <a:fillRef idx="1">
+            <a:schemeClr val="accent1"/>
+          </a:fillRef>
+          <a:effectRef idx="0">
+            <a:schemeClr val="accent1"/>
+          </a:effectRef>
+          <a:fontRef idx="minor">
+            <a:schemeClr val="lt1"/>
+          </a:fontRef>
+        </p:style>
+        <p:txBody>
+          <a:bodyPr rot="0" spcFirstLastPara="0" vertOverflow="overflow" horzOverflow="overflow" vert="horz" wrap="square" lIns="72000" tIns="72000" rIns="72000" bIns="72000" numCol="1" spcCol="0" rtlCol="0" fromWordArt="0" anchor="ctr" anchorCtr="0" forceAA="0" compatLnSpc="1">
+            <a:prstTxWarp prst="textNoShape">
+              <a:avLst/>
+            </a:prstTxWarp>
+            <a:noAutofit/>
+          </a:bodyPr>
+          <a:lstStyle/>
+          <a:p>
+            <a:pPr marL="180975" indent="-180975" algn="ctr">
+              <a:spcBef>
+                <a:spcPts val="200"/>
+              </a:spcBef>
+              <a:buFont typeface="Calibri" panose="020F0502020204030204" pitchFamily="34" charset="0"/>
+              <a:buChar char="▪"/>
+            </a:pPr>
+            <a:r>
+              <a:rPr lang="en-US" sz="1400" dirty="0"/>
+              <a:t>Rotary Encoder + SW</a:t>
+            </a:r>
+          </a:p>
+        </p:txBody>
+      </p:sp>
+      <p:sp>
+        <p:nvSpPr>
+          <p:cNvPr id="5" name="Rectangle 4">
+            <a:extLst>
+              <a:ext uri="{FF2B5EF4-FFF2-40B4-BE49-F238E27FC236}">
+                <a16:creationId xmlns:a16="http://schemas.microsoft.com/office/drawing/2014/main" id="{A172594B-5F4B-46D5-0B07-A93AD0A5ACE8}"/>
+              </a:ext>
+            </a:extLst>
+          </p:cNvPr>
+          <p:cNvSpPr/>
+          <p:nvPr/>
+        </p:nvSpPr>
+        <p:spPr>
+          <a:xfrm>
+            <a:off x="1506971" y="3742443"/>
+            <a:ext cx="1310326" cy="762784"/>
+          </a:xfrm>
+          <a:prstGeom prst="rect">
+            <a:avLst/>
+          </a:prstGeom>
+          <a:solidFill>
+            <a:schemeClr val="accent4"/>
+          </a:solidFill>
+          <a:ln>
+            <a:noFill/>
+          </a:ln>
+        </p:spPr>
+        <p:style>
+          <a:lnRef idx="2">
+            <a:schemeClr val="accent1">
+              <a:shade val="50000"/>
+            </a:schemeClr>
+          </a:lnRef>
+          <a:fillRef idx="1">
+            <a:schemeClr val="accent1"/>
+          </a:fillRef>
+          <a:effectRef idx="0">
+            <a:schemeClr val="accent1"/>
+          </a:effectRef>
+          <a:fontRef idx="minor">
+            <a:schemeClr val="lt1"/>
+          </a:fontRef>
+        </p:style>
+        <p:txBody>
+          <a:bodyPr rot="0" spcFirstLastPara="0" vertOverflow="overflow" horzOverflow="overflow" vert="horz" wrap="square" lIns="72000" tIns="72000" rIns="72000" bIns="72000" numCol="1" spcCol="0" rtlCol="0" fromWordArt="0" anchor="ctr" anchorCtr="0" forceAA="0" compatLnSpc="1">
+            <a:prstTxWarp prst="textNoShape">
+              <a:avLst/>
+            </a:prstTxWarp>
+            <a:noAutofit/>
+          </a:bodyPr>
+          <a:lstStyle/>
+          <a:p>
+            <a:pPr marL="180975" indent="-180975" algn="ctr">
+              <a:spcBef>
+                <a:spcPts val="200"/>
+              </a:spcBef>
+              <a:buFont typeface="Calibri" panose="020F0502020204030204" pitchFamily="34" charset="0"/>
+              <a:buChar char="▪"/>
+            </a:pPr>
+            <a:r>
+              <a:rPr lang="en-US" sz="1400" dirty="0"/>
+              <a:t>SD Card</a:t>
+            </a:r>
+          </a:p>
+        </p:txBody>
+      </p:sp>
+      <p:sp>
+        <p:nvSpPr>
+          <p:cNvPr id="6" name="Rectangle 5">
+            <a:extLst>
+              <a:ext uri="{FF2B5EF4-FFF2-40B4-BE49-F238E27FC236}">
+                <a16:creationId xmlns:a16="http://schemas.microsoft.com/office/drawing/2014/main" id="{9F84748A-5999-7088-8F60-578213BA9B1D}"/>
+              </a:ext>
+            </a:extLst>
+          </p:cNvPr>
+          <p:cNvSpPr/>
+          <p:nvPr/>
+        </p:nvSpPr>
+        <p:spPr>
+          <a:xfrm>
+            <a:off x="9571471" y="3390900"/>
+            <a:ext cx="1310326" cy="182249"/>
+          </a:xfrm>
+          <a:prstGeom prst="rect">
+            <a:avLst/>
+          </a:prstGeom>
+          <a:solidFill>
+            <a:schemeClr val="accent4"/>
+          </a:solidFill>
+          <a:ln>
+            <a:noFill/>
+          </a:ln>
+        </p:spPr>
+        <p:style>
+          <a:lnRef idx="2">
+            <a:schemeClr val="accent1">
+              <a:shade val="50000"/>
+            </a:schemeClr>
+          </a:lnRef>
+          <a:fillRef idx="1">
+            <a:schemeClr val="accent1"/>
+          </a:fillRef>
+          <a:effectRef idx="0">
+            <a:schemeClr val="accent1"/>
+          </a:effectRef>
+          <a:fontRef idx="minor">
+            <a:schemeClr val="lt1"/>
+          </a:fontRef>
+        </p:style>
+        <p:txBody>
+          <a:bodyPr rot="0" spcFirstLastPara="0" vertOverflow="overflow" horzOverflow="overflow" vert="horz" wrap="square" lIns="72000" tIns="72000" rIns="72000" bIns="72000" numCol="1" spcCol="0" rtlCol="0" fromWordArt="0" anchor="ctr" anchorCtr="0" forceAA="0" compatLnSpc="1">
+            <a:prstTxWarp prst="textNoShape">
+              <a:avLst/>
+            </a:prstTxWarp>
+            <a:noAutofit/>
+          </a:bodyPr>
+          <a:lstStyle/>
+          <a:p>
+            <a:pPr algn="ctr">
+              <a:spcBef>
+                <a:spcPts val="200"/>
+              </a:spcBef>
+            </a:pPr>
+            <a:r>
+              <a:rPr lang="en-US" sz="1400" dirty="0"/>
+              <a:t>LED</a:t>
+            </a:r>
+          </a:p>
+        </p:txBody>
+      </p:sp>
+    </p:spTree>
+    <p:extLst>
+      <p:ext uri="{BB962C8B-B14F-4D97-AF65-F5344CB8AC3E}">
+        <p14:creationId xmlns:p14="http://schemas.microsoft.com/office/powerpoint/2010/main" val="882265010"/>
+      </p:ext>
+    </p:extLst>
+  </p:cSld>
+  <p:clrMapOvr>
+    <a:masterClrMapping/>
+  </p:clrMapOvr>
+</p:sld>
+</file>
+
 <file path=ppt/tags/tag1.xml><?xml version="1.0" encoding="utf-8"?>
 <p:tagLst xmlns:a="http://schemas.openxmlformats.org/drawingml/2006/main" xmlns:r="http://schemas.openxmlformats.org/officeDocument/2006/relationships" xmlns:p="http://schemas.openxmlformats.org/presentationml/2006/main">
   <p:tag name="THINKCELLSHAPEDONOTDELETE" val="thinkcellActiveDocDoNotDelete"/>

</xml_diff>